<commit_message>
minor updates to slides/notes
</commit_message>
<xml_diff>
--- a/Presentation/Crypto-Pitfalls.pptx
+++ b/Presentation/Crypto-Pitfalls.pptx
@@ -13,8 +13,9 @@
     <p:sldId id="264" r:id="rId7"/>
     <p:sldId id="266" r:id="rId8"/>
     <p:sldId id="265" r:id="rId9"/>
-    <p:sldId id="260" r:id="rId10"/>
-    <p:sldId id="262" r:id="rId11"/>
+    <p:sldId id="267" r:id="rId10"/>
+    <p:sldId id="260" r:id="rId11"/>
+    <p:sldId id="262" r:id="rId12"/>
   </p:sldIdLst>
   <p:sldSz cx="12192000" cy="6858000"/>
   <p:notesSz cx="6858000" cy="9144000"/>
@@ -252,7 +253,7 @@
           <a:p>
             <a:fld id="{82B1C88E-CFFD-47E5-AEA1-568AFED29D99}" type="datetimeFigureOut">
               <a:rPr lang="en-US" smtClean="0"/>
-              <a:t>2/3/2015</a:t>
+              <a:t>2/4/2015</a:t>
             </a:fld>
             <a:endParaRPr lang="en-US"/>
           </a:p>
@@ -422,7 +423,7 @@
           <a:p>
             <a:fld id="{82B1C88E-CFFD-47E5-AEA1-568AFED29D99}" type="datetimeFigureOut">
               <a:rPr lang="en-US" smtClean="0"/>
-              <a:t>2/3/2015</a:t>
+              <a:t>2/4/2015</a:t>
             </a:fld>
             <a:endParaRPr lang="en-US"/>
           </a:p>
@@ -602,7 +603,7 @@
           <a:p>
             <a:fld id="{82B1C88E-CFFD-47E5-AEA1-568AFED29D99}" type="datetimeFigureOut">
               <a:rPr lang="en-US" smtClean="0"/>
-              <a:t>2/3/2015</a:t>
+              <a:t>2/4/2015</a:t>
             </a:fld>
             <a:endParaRPr lang="en-US"/>
           </a:p>
@@ -772,7 +773,7 @@
           <a:p>
             <a:fld id="{82B1C88E-CFFD-47E5-AEA1-568AFED29D99}" type="datetimeFigureOut">
               <a:rPr lang="en-US" smtClean="0"/>
-              <a:t>2/3/2015</a:t>
+              <a:t>2/4/2015</a:t>
             </a:fld>
             <a:endParaRPr lang="en-US"/>
           </a:p>
@@ -1018,7 +1019,7 @@
           <a:p>
             <a:fld id="{82B1C88E-CFFD-47E5-AEA1-568AFED29D99}" type="datetimeFigureOut">
               <a:rPr lang="en-US" smtClean="0"/>
-              <a:t>2/3/2015</a:t>
+              <a:t>2/4/2015</a:t>
             </a:fld>
             <a:endParaRPr lang="en-US"/>
           </a:p>
@@ -1250,7 +1251,7 @@
           <a:p>
             <a:fld id="{82B1C88E-CFFD-47E5-AEA1-568AFED29D99}" type="datetimeFigureOut">
               <a:rPr lang="en-US" smtClean="0"/>
-              <a:t>2/3/2015</a:t>
+              <a:t>2/4/2015</a:t>
             </a:fld>
             <a:endParaRPr lang="en-US"/>
           </a:p>
@@ -1617,7 +1618,7 @@
           <a:p>
             <a:fld id="{82B1C88E-CFFD-47E5-AEA1-568AFED29D99}" type="datetimeFigureOut">
               <a:rPr lang="en-US" smtClean="0"/>
-              <a:t>2/3/2015</a:t>
+              <a:t>2/4/2015</a:t>
             </a:fld>
             <a:endParaRPr lang="en-US"/>
           </a:p>
@@ -1735,7 +1736,7 @@
           <a:p>
             <a:fld id="{82B1C88E-CFFD-47E5-AEA1-568AFED29D99}" type="datetimeFigureOut">
               <a:rPr lang="en-US" smtClean="0"/>
-              <a:t>2/3/2015</a:t>
+              <a:t>2/4/2015</a:t>
             </a:fld>
             <a:endParaRPr lang="en-US"/>
           </a:p>
@@ -1830,7 +1831,7 @@
           <a:p>
             <a:fld id="{82B1C88E-CFFD-47E5-AEA1-568AFED29D99}" type="datetimeFigureOut">
               <a:rPr lang="en-US" smtClean="0"/>
-              <a:t>2/3/2015</a:t>
+              <a:t>2/4/2015</a:t>
             </a:fld>
             <a:endParaRPr lang="en-US"/>
           </a:p>
@@ -2107,7 +2108,7 @@
           <a:p>
             <a:fld id="{82B1C88E-CFFD-47E5-AEA1-568AFED29D99}" type="datetimeFigureOut">
               <a:rPr lang="en-US" smtClean="0"/>
-              <a:t>2/3/2015</a:t>
+              <a:t>2/4/2015</a:t>
             </a:fld>
             <a:endParaRPr lang="en-US"/>
           </a:p>
@@ -2360,7 +2361,7 @@
           <a:p>
             <a:fld id="{82B1C88E-CFFD-47E5-AEA1-568AFED29D99}" type="datetimeFigureOut">
               <a:rPr lang="en-US" smtClean="0"/>
-              <a:t>2/3/2015</a:t>
+              <a:t>2/4/2015</a:t>
             </a:fld>
             <a:endParaRPr lang="en-US"/>
           </a:p>
@@ -2573,7 +2574,7 @@
           <a:p>
             <a:fld id="{82B1C88E-CFFD-47E5-AEA1-568AFED29D99}" type="datetimeFigureOut">
               <a:rPr lang="en-US" smtClean="0"/>
-              <a:t>2/3/2015</a:t>
+              <a:t>2/4/2015</a:t>
             </a:fld>
             <a:endParaRPr lang="en-US"/>
           </a:p>
@@ -3090,6 +3091,138 @@
           <a:p>
             <a:r>
               <a:rPr lang="en-US" dirty="0" smtClean="0"/>
+              <a:t>Lessons Learned</a:t>
+            </a:r>
+            <a:endParaRPr lang="en-US" dirty="0"/>
+          </a:p>
+        </p:txBody>
+      </p:sp>
+      <p:sp>
+        <p:nvSpPr>
+          <p:cNvPr id="3" name="Content Placeholder 2"/>
+          <p:cNvSpPr>
+            <a:spLocks noGrp="1"/>
+          </p:cNvSpPr>
+          <p:nvPr>
+            <p:ph idx="1"/>
+          </p:nvPr>
+        </p:nvSpPr>
+        <p:spPr/>
+        <p:txBody>
+          <a:bodyPr>
+            <a:normAutofit/>
+          </a:bodyPr>
+          <a:lstStyle/>
+          <a:p>
+            <a:r>
+              <a:rPr lang="en-US" dirty="0" smtClean="0"/>
+              <a:t>Never use a static Initialization Vector</a:t>
+            </a:r>
+          </a:p>
+          <a:p>
+            <a:r>
+              <a:rPr lang="en-US" dirty="0"/>
+              <a:t>Don’t expose </a:t>
+            </a:r>
+            <a:r>
+              <a:rPr lang="en-US" dirty="0" smtClean="0"/>
+              <a:t>error status codes over the public API</a:t>
+            </a:r>
+            <a:endParaRPr lang="en-US" dirty="0"/>
+          </a:p>
+          <a:p>
+            <a:r>
+              <a:rPr lang="en-US" dirty="0" smtClean="0"/>
+              <a:t>Never use encryption without authentication e.g. HMAC</a:t>
+            </a:r>
+          </a:p>
+          <a:p>
+            <a:pPr lvl="1"/>
+            <a:r>
+              <a:rPr lang="en-US" dirty="0" smtClean="0"/>
+              <a:t>Do not use same key for authentication and encryption</a:t>
+            </a:r>
+          </a:p>
+          <a:p>
+            <a:r>
+              <a:rPr lang="en-US" dirty="0" smtClean="0"/>
+              <a:t>Use cryptography with extreme caution</a:t>
+            </a:r>
+            <a:r>
+              <a:rPr lang="en-US" dirty="0"/>
+              <a:t> </a:t>
+            </a:r>
+            <a:r>
+              <a:rPr lang="en-US" dirty="0" smtClean="0"/>
+              <a:t>and extra code reviews</a:t>
+            </a:r>
+          </a:p>
+          <a:p>
+            <a:pPr lvl="1"/>
+            <a:r>
+              <a:rPr lang="en-US" dirty="0" smtClean="0">
+                <a:hlinkClick r:id="rId2"/>
+              </a:rPr>
+              <a:t>http://www.happybearsoftware.com/you-are-dangerously-bad-at-cryptography.html</a:t>
+            </a:r>
+            <a:endParaRPr lang="en-US" dirty="0" smtClean="0"/>
+          </a:p>
+        </p:txBody>
+      </p:sp>
+    </p:spTree>
+    <p:extLst>
+      <p:ext uri="{BB962C8B-B14F-4D97-AF65-F5344CB8AC3E}">
+        <p14:creationId xmlns:p14="http://schemas.microsoft.com/office/powerpoint/2010/main" val="118598558"/>
+      </p:ext>
+    </p:extLst>
+  </p:cSld>
+  <p:clrMapOvr>
+    <a:masterClrMapping/>
+  </p:clrMapOvr>
+  <p:timing>
+    <p:tnLst>
+      <p:par>
+        <p:cTn id="1" dur="indefinite" restart="never" nodeType="tmRoot"/>
+      </p:par>
+    </p:tnLst>
+  </p:timing>
+</p:sld>
+</file>
+
+<file path=ppt/slides/slide11.xml><?xml version="1.0" encoding="utf-8"?>
+<p:sld xmlns:a="http://schemas.openxmlformats.org/drawingml/2006/main" xmlns:r="http://schemas.openxmlformats.org/officeDocument/2006/relationships" xmlns:p="http://schemas.openxmlformats.org/presentationml/2006/main">
+  <p:cSld>
+    <p:spTree>
+      <p:nvGrpSpPr>
+        <p:cNvPr id="1" name=""/>
+        <p:cNvGrpSpPr/>
+        <p:nvPr/>
+      </p:nvGrpSpPr>
+      <p:grpSpPr>
+        <a:xfrm>
+          <a:off x="0" y="0"/>
+          <a:ext cx="0" cy="0"/>
+          <a:chOff x="0" y="0"/>
+          <a:chExt cx="0" cy="0"/>
+        </a:xfrm>
+      </p:grpSpPr>
+      <p:sp>
+        <p:nvSpPr>
+          <p:cNvPr id="2" name="Title 1"/>
+          <p:cNvSpPr>
+            <a:spLocks noGrp="1"/>
+          </p:cNvSpPr>
+          <p:nvPr>
+            <p:ph type="title"/>
+          </p:nvPr>
+        </p:nvSpPr>
+        <p:spPr/>
+        <p:txBody>
+          <a:bodyPr/>
+          <a:lstStyle/>
+          <a:p>
+            <a:r>
+              <a:rPr lang="en-US" dirty="0" smtClean="0"/>
               <a:t>Further reference</a:t>
             </a:r>
             <a:endParaRPr lang="en-US" dirty="0"/>
@@ -3988,7 +4121,11 @@
             </a:pPr>
             <a:r>
               <a:rPr lang="en-US" dirty="0" smtClean="0"/>
-              <a:t>Before decrypting, verify the hash (using constant-time comparison)</a:t>
+              <a:t>Before decrypting, verify the </a:t>
+            </a:r>
+            <a:r>
+              <a:rPr lang="en-US" dirty="0" smtClean="0"/>
+              <a:t>hash</a:t>
             </a:r>
           </a:p>
           <a:p>
@@ -3998,7 +4135,11 @@
             </a:pPr>
             <a:r>
               <a:rPr lang="en-US" dirty="0" smtClean="0"/>
-              <a:t>Only once we’re confident of the token’s integrity should we begin to decrypt it</a:t>
+              <a:t>Only </a:t>
+            </a:r>
+            <a:r>
+              <a:rPr lang="en-US" dirty="0" smtClean="0"/>
+              <a:t>once we’re confident of the token’s integrity should we begin to decrypt it</a:t>
             </a:r>
           </a:p>
           <a:p>
@@ -4082,7 +4223,7 @@
           <a:p>
             <a:r>
               <a:rPr lang="en-US" dirty="0" smtClean="0"/>
-              <a:t>Lessons Learned</a:t>
+              <a:t>Bonus Pitfall</a:t>
             </a:r>
             <a:endParaRPr lang="en-US" dirty="0"/>
           </a:p>
@@ -4100,70 +4241,28 @@
         </p:nvSpPr>
         <p:spPr/>
         <p:txBody>
-          <a:bodyPr>
-            <a:normAutofit/>
-          </a:bodyPr>
-          <a:lstStyle/>
-          <a:p>
+          <a:bodyPr/>
+          <a:lstStyle/>
+          <a:p>
+            <a:pPr marL="0" indent="0">
+              <a:buNone/>
+            </a:pPr>
+            <a:r>
+              <a:rPr lang="en-US" dirty="0"/>
+              <a:t>non-constant time </a:t>
+            </a:r>
             <a:r>
               <a:rPr lang="en-US" dirty="0" smtClean="0"/>
-              <a:t>Never use a static Initialization Vector</a:t>
-            </a:r>
-          </a:p>
-          <a:p>
-            <a:r>
-              <a:rPr lang="en-US" dirty="0"/>
-              <a:t>Don’t expose </a:t>
-            </a:r>
-            <a:r>
-              <a:rPr lang="en-US" dirty="0" smtClean="0"/>
-              <a:t>error status codes over the public API</a:t>
+              <a:t>comparison of the MAC</a:t>
             </a:r>
             <a:endParaRPr lang="en-US" dirty="0"/>
-          </a:p>
-          <a:p>
-            <a:r>
-              <a:rPr lang="en-US" dirty="0" smtClean="0"/>
-              <a:t>Never use encryption without authentication e.g. HMAC</a:t>
-            </a:r>
-          </a:p>
-          <a:p>
-            <a:pPr lvl="1"/>
-            <a:r>
-              <a:rPr lang="en-US" dirty="0" smtClean="0"/>
-              <a:t>Do not use same key for authentication and encryption</a:t>
-            </a:r>
-          </a:p>
-          <a:p>
-            <a:r>
-              <a:rPr lang="en-US" dirty="0" smtClean="0"/>
-              <a:t>Use cryptography with extreme caution</a:t>
-            </a:r>
-            <a:r>
-              <a:rPr lang="en-US" dirty="0"/>
-              <a:t> </a:t>
-            </a:r>
-            <a:r>
-              <a:rPr lang="en-US" dirty="0" smtClean="0"/>
-              <a:t>and extra code reviews</a:t>
-            </a:r>
-          </a:p>
-          <a:p>
-            <a:pPr lvl="1"/>
-            <a:r>
-              <a:rPr lang="en-US" dirty="0" smtClean="0">
-                <a:hlinkClick r:id="rId2"/>
-              </a:rPr>
-              <a:t>http://www.happybearsoftware.com/you-are-dangerously-bad-at-cryptography.html</a:t>
-            </a:r>
-            <a:endParaRPr lang="en-US" dirty="0" smtClean="0"/>
           </a:p>
         </p:txBody>
       </p:sp>
     </p:spTree>
     <p:extLst>
       <p:ext uri="{BB962C8B-B14F-4D97-AF65-F5344CB8AC3E}">
-        <p14:creationId xmlns:p14="http://schemas.microsoft.com/office/powerpoint/2010/main" val="118598558"/>
+        <p14:creationId xmlns:p14="http://schemas.microsoft.com/office/powerpoint/2010/main" val="1025169133"/>
       </p:ext>
     </p:extLst>
   </p:cSld>

</xml_diff>